<commit_message>
Modification de la Maquette_Module_Gestion.pptx + modif des fichiers pencil
</commit_message>
<xml_diff>
--- a/Documents/Maquettage/Diaporama/Maquette_Module_Gestion.pptx
+++ b/Documents/Maquettage/Diaporama/Maquette_Module_Gestion.pptx
@@ -12,11 +12,13 @@
     <p:sldId id="260" r:id="rId6"/>
     <p:sldId id="261" r:id="rId7"/>
     <p:sldId id="262" r:id="rId8"/>
-    <p:sldId id="263" r:id="rId9"/>
-    <p:sldId id="266" r:id="rId10"/>
-    <p:sldId id="264" r:id="rId11"/>
-    <p:sldId id="265" r:id="rId12"/>
-    <p:sldId id="267" r:id="rId13"/>
+    <p:sldId id="268" r:id="rId9"/>
+    <p:sldId id="263" r:id="rId10"/>
+    <p:sldId id="266" r:id="rId11"/>
+    <p:sldId id="264" r:id="rId12"/>
+    <p:sldId id="269" r:id="rId13"/>
+    <p:sldId id="265" r:id="rId14"/>
+    <p:sldId id="267" r:id="rId15"/>
   </p:sldIdLst>
   <p:sldSz cx="9144000" cy="6858000" type="screen4x3"/>
   <p:notesSz cx="6858000" cy="9144000"/>
@@ -253,7 +255,7 @@
             <a:fld id="{BCD8A87E-26FC-4096-B9CD-CE44FE412FC9}" type="datetimeFigureOut">
               <a:rPr lang="fr-FR" smtClean="0"/>
               <a:pPr/>
-              <a:t>10/03/2016</a:t>
+              <a:t>27/04/2016</a:t>
             </a:fld>
             <a:endParaRPr lang="fr-FR"/>
           </a:p>
@@ -568,7 +570,7 @@
             <a:fld id="{BCD8A87E-26FC-4096-B9CD-CE44FE412FC9}" type="datetimeFigureOut">
               <a:rPr lang="fr-FR" smtClean="0"/>
               <a:pPr/>
-              <a:t>10/03/2016</a:t>
+              <a:t>27/04/2016</a:t>
             </a:fld>
             <a:endParaRPr lang="fr-FR"/>
           </a:p>
@@ -755,7 +757,7 @@
             <a:fld id="{BCD8A87E-26FC-4096-B9CD-CE44FE412FC9}" type="datetimeFigureOut">
               <a:rPr lang="fr-FR" smtClean="0"/>
               <a:pPr/>
-              <a:t>10/03/2016</a:t>
+              <a:t>27/04/2016</a:t>
             </a:fld>
             <a:endParaRPr lang="fr-FR"/>
           </a:p>
@@ -932,7 +934,7 @@
             <a:fld id="{BCD8A87E-26FC-4096-B9CD-CE44FE412FC9}" type="datetimeFigureOut">
               <a:rPr lang="fr-FR" smtClean="0"/>
               <a:pPr/>
-              <a:t>10/03/2016</a:t>
+              <a:t>27/04/2016</a:t>
             </a:fld>
             <a:endParaRPr lang="fr-FR"/>
           </a:p>
@@ -1202,7 +1204,7 @@
             <a:fld id="{BCD8A87E-26FC-4096-B9CD-CE44FE412FC9}" type="datetimeFigureOut">
               <a:rPr lang="fr-FR" smtClean="0"/>
               <a:pPr/>
-              <a:t>10/03/2016</a:t>
+              <a:t>27/04/2016</a:t>
             </a:fld>
             <a:endParaRPr lang="fr-FR"/>
           </a:p>
@@ -1672,7 +1674,7 @@
             <a:fld id="{BCD8A87E-26FC-4096-B9CD-CE44FE412FC9}" type="datetimeFigureOut">
               <a:rPr lang="fr-FR" smtClean="0"/>
               <a:pPr/>
-              <a:t>10/03/2016</a:t>
+              <a:t>27/04/2016</a:t>
             </a:fld>
             <a:endParaRPr lang="fr-FR"/>
           </a:p>
@@ -2163,7 +2165,7 @@
             <a:fld id="{BCD8A87E-26FC-4096-B9CD-CE44FE412FC9}" type="datetimeFigureOut">
               <a:rPr lang="fr-FR" smtClean="0"/>
               <a:pPr/>
-              <a:t>10/03/2016</a:t>
+              <a:t>27/04/2016</a:t>
             </a:fld>
             <a:endParaRPr lang="fr-FR"/>
           </a:p>
@@ -2291,7 +2293,7 @@
             <a:fld id="{BCD8A87E-26FC-4096-B9CD-CE44FE412FC9}" type="datetimeFigureOut">
               <a:rPr lang="fr-FR" smtClean="0"/>
               <a:pPr/>
-              <a:t>10/03/2016</a:t>
+              <a:t>27/04/2016</a:t>
             </a:fld>
             <a:endParaRPr lang="fr-FR"/>
           </a:p>
@@ -2437,7 +2439,7 @@
             <a:fld id="{BCD8A87E-26FC-4096-B9CD-CE44FE412FC9}" type="datetimeFigureOut">
               <a:rPr lang="fr-FR" smtClean="0"/>
               <a:pPr/>
-              <a:t>10/03/2016</a:t>
+              <a:t>27/04/2016</a:t>
             </a:fld>
             <a:endParaRPr lang="fr-FR"/>
           </a:p>
@@ -2761,7 +2763,7 @@
             <a:fld id="{BCD8A87E-26FC-4096-B9CD-CE44FE412FC9}" type="datetimeFigureOut">
               <a:rPr lang="fr-FR" smtClean="0"/>
               <a:pPr/>
-              <a:t>10/03/2016</a:t>
+              <a:t>27/04/2016</a:t>
             </a:fld>
             <a:endParaRPr lang="fr-FR"/>
           </a:p>
@@ -2897,7 +2899,7 @@
             <a:fld id="{BCD8A87E-26FC-4096-B9CD-CE44FE412FC9}" type="datetimeFigureOut">
               <a:rPr lang="fr-FR" smtClean="0"/>
               <a:pPr/>
-              <a:t>10/03/2016</a:t>
+              <a:t>27/04/2016</a:t>
             </a:fld>
             <a:endParaRPr lang="fr-FR"/>
           </a:p>
@@ -3680,7 +3682,7 @@
             <a:fld id="{BCD8A87E-26FC-4096-B9CD-CE44FE412FC9}" type="datetimeFigureOut">
               <a:rPr lang="fr-FR" smtClean="0"/>
               <a:pPr/>
-              <a:t>10/03/2016</a:t>
+              <a:t>27/04/2016</a:t>
             </a:fld>
             <a:endParaRPr lang="fr-FR"/>
           </a:p>
@@ -4200,7 +4202,16 @@
           <a:prstGeom prst="rect">
             <a:avLst/>
           </a:prstGeom>
-          <a:noFill/>
+          <a:ln>
+            <a:noFill/>
+          </a:ln>
+          <a:effectLst>
+            <a:outerShdw blurRad="190500" algn="tl" rotWithShape="0">
+              <a:srgbClr val="000000">
+                <a:alpha val="70000"/>
+              </a:srgbClr>
+            </a:outerShdw>
+          </a:effectLst>
         </p:spPr>
       </p:pic>
       <p:sp>
@@ -4271,9 +4282,52 @@
           <a:chExt cx="0" cy="0"/>
         </a:xfrm>
       </p:grpSpPr>
+      <p:sp>
+        <p:nvSpPr>
+          <p:cNvPr id="2" name="ZoneTexte 1"/>
+          <p:cNvSpPr txBox="1"/>
+          <p:nvPr/>
+        </p:nvSpPr>
+        <p:spPr>
+          <a:xfrm>
+            <a:off x="251520" y="260648"/>
+            <a:ext cx="7263527" cy="707886"/>
+          </a:xfrm>
+          <a:prstGeom prst="rect">
+            <a:avLst/>
+          </a:prstGeom>
+          <a:noFill/>
+        </p:spPr>
+        <p:txBody>
+          <a:bodyPr wrap="none" rtlCol="0">
+            <a:spAutoFit/>
+          </a:bodyPr>
+          <a:lstStyle/>
+          <a:p>
+            <a:r>
+              <a:rPr lang="fr-FR" sz="4000" b="1" dirty="0" smtClean="0">
+                <a:latin typeface="Courier New" pitchFamily="49" charset="0"/>
+                <a:cs typeface="Courier New" pitchFamily="49" charset="0"/>
+              </a:rPr>
+              <a:t>Impression du </a:t>
+            </a:r>
+            <a:r>
+              <a:rPr lang="fr-FR" sz="4000" b="1" dirty="0" err="1" smtClean="0">
+                <a:latin typeface="Courier New" pitchFamily="49" charset="0"/>
+                <a:cs typeface="Courier New" pitchFamily="49" charset="0"/>
+              </a:rPr>
+              <a:t>FlashCode</a:t>
+            </a:r>
+            <a:endParaRPr lang="fr-FR" sz="4000" b="1" dirty="0">
+              <a:latin typeface="Courier New" pitchFamily="49" charset="0"/>
+              <a:cs typeface="Courier New" pitchFamily="49" charset="0"/>
+            </a:endParaRPr>
+          </a:p>
+        </p:txBody>
+      </p:sp>
       <p:pic>
         <p:nvPicPr>
-          <p:cNvPr id="3074" name="Picture 2" descr="C:\Users\Franck\Downloads\Crud_Oeuvre.PNG"/>
+          <p:cNvPr id="5122" name="Picture 2" descr="C:\Users\Franck\Downloads\Capture3.PNG"/>
           <p:cNvPicPr>
             <a:picLocks noChangeAspect="1" noChangeArrowheads="1"/>
           </p:cNvPicPr>
@@ -4288,8 +4342,8 @@
         </p:blipFill>
         <p:spPr bwMode="auto">
           <a:xfrm>
-            <a:off x="1115616" y="1052736"/>
-            <a:ext cx="7920880" cy="5472608"/>
+            <a:off x="1403648" y="1196752"/>
+            <a:ext cx="7488832" cy="5455543"/>
           </a:xfrm>
           <a:prstGeom prst="rect">
             <a:avLst/>
@@ -4297,6 +4351,38 @@
           <a:noFill/>
         </p:spPr>
       </p:pic>
+    </p:spTree>
+  </p:cSld>
+  <p:clrMapOvr>
+    <a:masterClrMapping/>
+  </p:clrMapOvr>
+  <p:timing>
+    <p:tnLst>
+      <p:par>
+        <p:cTn id="1" dur="indefinite" restart="never" nodeType="tmRoot"/>
+      </p:par>
+    </p:tnLst>
+  </p:timing>
+</p:sld>
+</file>
+
+<file path=ppt/slides/slide11.xml><?xml version="1.0" encoding="utf-8"?>
+<p:sld xmlns:a="http://schemas.openxmlformats.org/drawingml/2006/main" xmlns:r="http://schemas.openxmlformats.org/officeDocument/2006/relationships" xmlns:p="http://schemas.openxmlformats.org/presentationml/2006/main">
+  <p:cSld>
+    <p:spTree>
+      <p:nvGrpSpPr>
+        <p:cNvPr id="1" name=""/>
+        <p:cNvGrpSpPr/>
+        <p:nvPr/>
+      </p:nvGrpSpPr>
+      <p:grpSpPr>
+        <a:xfrm>
+          <a:off x="0" y="0"/>
+          <a:ext cx="0" cy="0"/>
+          <a:chOff x="0" y="0"/>
+          <a:chExt cx="0" cy="0"/>
+        </a:xfrm>
+      </p:grpSpPr>
       <p:sp>
         <p:nvSpPr>
           <p:cNvPr id="4" name="ZoneTexte 3"/>
@@ -4333,6 +4419,142 @@
           </a:p>
         </p:txBody>
       </p:sp>
+      <p:pic>
+        <p:nvPicPr>
+          <p:cNvPr id="5" name="Image 4" descr="CaptureFormOeuvre.PNG"/>
+          <p:cNvPicPr>
+            <a:picLocks noChangeAspect="1"/>
+          </p:cNvPicPr>
+          <p:nvPr/>
+        </p:nvPicPr>
+        <p:blipFill>
+          <a:blip r:embed="rId2" cstate="print"/>
+          <a:stretch>
+            <a:fillRect/>
+          </a:stretch>
+        </p:blipFill>
+        <p:spPr>
+          <a:xfrm>
+            <a:off x="1259632" y="980728"/>
+            <a:ext cx="7560840" cy="5693170"/>
+          </a:xfrm>
+          <a:prstGeom prst="rect">
+            <a:avLst/>
+          </a:prstGeom>
+          <a:ln>
+            <a:noFill/>
+          </a:ln>
+          <a:effectLst>
+            <a:outerShdw blurRad="190500" algn="tl" rotWithShape="0">
+              <a:srgbClr val="000000">
+                <a:alpha val="70000"/>
+              </a:srgbClr>
+            </a:outerShdw>
+          </a:effectLst>
+        </p:spPr>
+      </p:pic>
+    </p:spTree>
+  </p:cSld>
+  <p:clrMapOvr>
+    <a:masterClrMapping/>
+  </p:clrMapOvr>
+  <p:timing>
+    <p:tnLst>
+      <p:par>
+        <p:cTn id="1" dur="indefinite" restart="never" nodeType="tmRoot"/>
+      </p:par>
+    </p:tnLst>
+  </p:timing>
+</p:sld>
+</file>
+
+<file path=ppt/slides/slide12.xml><?xml version="1.0" encoding="utf-8"?>
+<p:sld xmlns:a="http://schemas.openxmlformats.org/drawingml/2006/main" xmlns:r="http://schemas.openxmlformats.org/officeDocument/2006/relationships" xmlns:p="http://schemas.openxmlformats.org/presentationml/2006/main">
+  <p:cSld>
+    <p:spTree>
+      <p:nvGrpSpPr>
+        <p:cNvPr id="1" name=""/>
+        <p:cNvGrpSpPr/>
+        <p:nvPr/>
+      </p:nvGrpSpPr>
+      <p:grpSpPr>
+        <a:xfrm>
+          <a:off x="0" y="0"/>
+          <a:ext cx="0" cy="0"/>
+          <a:chOff x="0" y="0"/>
+          <a:chExt cx="0" cy="0"/>
+        </a:xfrm>
+      </p:grpSpPr>
+      <p:sp>
+        <p:nvSpPr>
+          <p:cNvPr id="4" name="ZoneTexte 3"/>
+          <p:cNvSpPr txBox="1"/>
+          <p:nvPr/>
+        </p:nvSpPr>
+        <p:spPr>
+          <a:xfrm>
+            <a:off x="251520" y="260648"/>
+            <a:ext cx="8802410" cy="707886"/>
+          </a:xfrm>
+          <a:prstGeom prst="rect">
+            <a:avLst/>
+          </a:prstGeom>
+          <a:noFill/>
+        </p:spPr>
+        <p:txBody>
+          <a:bodyPr wrap="none" rtlCol="0">
+            <a:spAutoFit/>
+          </a:bodyPr>
+          <a:lstStyle/>
+          <a:p>
+            <a:r>
+              <a:rPr lang="fr-FR" sz="4000" b="1" dirty="0" smtClean="0">
+                <a:latin typeface="Courier New" pitchFamily="49" charset="0"/>
+                <a:cs typeface="Courier New" pitchFamily="49" charset="0"/>
+              </a:rPr>
+              <a:t>Création d’un nouvel artiste</a:t>
+            </a:r>
+            <a:endParaRPr lang="fr-FR" sz="4000" b="1" dirty="0">
+              <a:latin typeface="Courier New" pitchFamily="49" charset="0"/>
+              <a:cs typeface="Courier New" pitchFamily="49" charset="0"/>
+            </a:endParaRPr>
+          </a:p>
+        </p:txBody>
+      </p:sp>
+      <p:pic>
+        <p:nvPicPr>
+          <p:cNvPr id="5" name="Image 4" descr="CaptureFormArtiste.PNG"/>
+          <p:cNvPicPr>
+            <a:picLocks noChangeAspect="1"/>
+          </p:cNvPicPr>
+          <p:nvPr/>
+        </p:nvPicPr>
+        <p:blipFill>
+          <a:blip r:embed="rId2" cstate="print"/>
+          <a:stretch>
+            <a:fillRect/>
+          </a:stretch>
+        </p:blipFill>
+        <p:spPr>
+          <a:xfrm>
+            <a:off x="1835696" y="1268760"/>
+            <a:ext cx="6496957" cy="5291881"/>
+          </a:xfrm>
+          <a:prstGeom prst="rect">
+            <a:avLst/>
+          </a:prstGeom>
+          <a:ln>
+            <a:noFill/>
+          </a:ln>
+          <a:effectLst>
+            <a:outerShdw blurRad="190500" algn="tl" rotWithShape="0">
+              <a:srgbClr val="000000">
+                <a:alpha val="70000"/>
+              </a:srgbClr>
+            </a:outerShdw>
+          </a:effectLst>
+        </p:spPr>
+      </p:pic>
     </p:spTree>
   </p:cSld>
   <p:clrMapOvr>
@@ -4341,7 +4563,7 @@
 </p:sld>
 </file>
 
-<file path=ppt/slides/slide11.xml><?xml version="1.0" encoding="utf-8"?>
+<file path=ppt/slides/slide13.xml><?xml version="1.0" encoding="utf-8"?>
 <p:sld xmlns:a="http://schemas.openxmlformats.org/drawingml/2006/main" xmlns:r="http://schemas.openxmlformats.org/officeDocument/2006/relationships" xmlns:p="http://schemas.openxmlformats.org/presentationml/2006/main">
   <p:cSld>
     <p:spTree>
@@ -4381,7 +4603,16 @@
           <a:prstGeom prst="rect">
             <a:avLst/>
           </a:prstGeom>
-          <a:noFill/>
+          <a:ln>
+            <a:noFill/>
+          </a:ln>
+          <a:effectLst>
+            <a:outerShdw blurRad="190500" algn="tl" rotWithShape="0">
+              <a:srgbClr val="000000">
+                <a:alpha val="70000"/>
+              </a:srgbClr>
+            </a:outerShdw>
+          </a:effectLst>
         </p:spPr>
       </p:pic>
       <p:sp>
@@ -4425,10 +4656,17 @@
   <p:clrMapOvr>
     <a:masterClrMapping/>
   </p:clrMapOvr>
+  <p:timing>
+    <p:tnLst>
+      <p:par>
+        <p:cTn id="1" dur="indefinite" restart="never" nodeType="tmRoot"/>
+      </p:par>
+    </p:tnLst>
+  </p:timing>
 </p:sld>
 </file>
 
-<file path=ppt/slides/slide12.xml><?xml version="1.0" encoding="utf-8"?>
+<file path=ppt/slides/slide14.xml><?xml version="1.0" encoding="utf-8"?>
 <p:sld xmlns:a="http://schemas.openxmlformats.org/drawingml/2006/main" xmlns:r="http://schemas.openxmlformats.org/officeDocument/2006/relationships" xmlns:p="http://schemas.openxmlformats.org/presentationml/2006/main">
   <p:cSld>
     <p:spTree>
@@ -4468,7 +4706,16 @@
           <a:prstGeom prst="rect">
             <a:avLst/>
           </a:prstGeom>
-          <a:noFill/>
+          <a:ln>
+            <a:noFill/>
+          </a:ln>
+          <a:effectLst>
+            <a:outerShdw blurRad="190500" algn="tl" rotWithShape="0">
+              <a:srgbClr val="000000">
+                <a:alpha val="70000"/>
+              </a:srgbClr>
+            </a:outerShdw>
+          </a:effectLst>
         </p:spPr>
       </p:pic>
       <p:sp>
@@ -4512,6 +4759,13 @@
   <p:clrMapOvr>
     <a:masterClrMapping/>
   </p:clrMapOvr>
+  <p:timing>
+    <p:tnLst>
+      <p:par>
+        <p:cTn id="1" dur="indefinite" restart="never" nodeType="tmRoot"/>
+      </p:par>
+    </p:tnLst>
+  </p:timing>
 </p:sld>
 </file>
 
@@ -4555,7 +4809,16 @@
           <a:prstGeom prst="rect">
             <a:avLst/>
           </a:prstGeom>
-          <a:noFill/>
+          <a:ln>
+            <a:noFill/>
+          </a:ln>
+          <a:effectLst>
+            <a:outerShdw blurRad="190500" algn="tl" rotWithShape="0">
+              <a:srgbClr val="000000">
+                <a:alpha val="70000"/>
+              </a:srgbClr>
+            </a:outerShdw>
+          </a:effectLst>
         </p:spPr>
       </p:pic>
       <p:sp>
@@ -4649,7 +4912,16 @@
           <a:prstGeom prst="rect">
             <a:avLst/>
           </a:prstGeom>
-          <a:noFill/>
+          <a:ln>
+            <a:noFill/>
+          </a:ln>
+          <a:effectLst>
+            <a:outerShdw blurRad="190500" algn="tl" rotWithShape="0">
+              <a:srgbClr val="000000">
+                <a:alpha val="70000"/>
+              </a:srgbClr>
+            </a:outerShdw>
+          </a:effectLst>
         </p:spPr>
       </p:pic>
       <p:sp>
@@ -4737,13 +5009,22 @@
         </p:blipFill>
         <p:spPr bwMode="auto">
           <a:xfrm>
-            <a:off x="1259632" y="1268760"/>
+            <a:off x="1259632" y="1090761"/>
             <a:ext cx="7560840" cy="5362575"/>
           </a:xfrm>
           <a:prstGeom prst="rect">
             <a:avLst/>
           </a:prstGeom>
-          <a:noFill/>
+          <a:ln>
+            <a:noFill/>
+          </a:ln>
+          <a:effectLst>
+            <a:outerShdw blurRad="190500" algn="tl" rotWithShape="0">
+              <a:srgbClr val="000000">
+                <a:alpha val="70000"/>
+              </a:srgbClr>
+            </a:outerShdw>
+          </a:effectLst>
         </p:spPr>
       </p:pic>
       <p:sp>
@@ -4852,28 +5133,36 @@
       </p:sp>
       <p:pic>
         <p:nvPicPr>
-          <p:cNvPr id="1026" name="Picture 2" descr="C:\Users\Franck\Downloads\Crud_User.PNG"/>
+          <p:cNvPr id="4" name="Image 3" descr="CaptureFormUtilisateur.PNG"/>
           <p:cNvPicPr>
-            <a:picLocks noChangeAspect="1" noChangeArrowheads="1"/>
+            <a:picLocks noChangeAspect="1"/>
           </p:cNvPicPr>
           <p:nvPr/>
         </p:nvPicPr>
         <p:blipFill>
           <a:blip r:embed="rId2" cstate="print"/>
-          <a:srcRect/>
           <a:stretch>
             <a:fillRect/>
           </a:stretch>
         </p:blipFill>
-        <p:spPr bwMode="auto">
-          <a:xfrm>
-            <a:off x="1187625" y="1052736"/>
-            <a:ext cx="7776864" cy="5534025"/>
+        <p:spPr>
+          <a:xfrm>
+            <a:off x="1187624" y="1196752"/>
+            <a:ext cx="7704856" cy="5112568"/>
           </a:xfrm>
           <a:prstGeom prst="rect">
             <a:avLst/>
           </a:prstGeom>
-          <a:noFill/>
+          <a:ln>
+            <a:noFill/>
+          </a:ln>
+          <a:effectLst>
+            <a:outerShdw blurRad="190500" algn="tl" rotWithShape="0">
+              <a:srgbClr val="000000">
+                <a:alpha val="70000"/>
+              </a:srgbClr>
+            </a:outerShdw>
+          </a:effectLst>
         </p:spPr>
       </p:pic>
     </p:spTree>
@@ -4881,6 +5170,13 @@
   <p:clrMapOvr>
     <a:masterClrMapping/>
   </p:clrMapOvr>
+  <p:timing>
+    <p:tnLst>
+      <p:par>
+        <p:cTn id="1" dur="indefinite" restart="never" nodeType="tmRoot"/>
+      </p:par>
+    </p:tnLst>
+  </p:timing>
 </p:sld>
 </file>
 
@@ -4924,7 +5220,16 @@
           <a:prstGeom prst="rect">
             <a:avLst/>
           </a:prstGeom>
-          <a:noFill/>
+          <a:ln>
+            <a:noFill/>
+          </a:ln>
+          <a:effectLst>
+            <a:outerShdw blurRad="190500" algn="tl" rotWithShape="0">
+              <a:srgbClr val="000000">
+                <a:alpha val="70000"/>
+              </a:srgbClr>
+            </a:outerShdw>
+          </a:effectLst>
         </p:spPr>
       </p:pic>
       <p:sp>
@@ -4968,6 +5273,13 @@
   <p:clrMapOvr>
     <a:masterClrMapping/>
   </p:clrMapOvr>
+  <p:timing>
+    <p:tnLst>
+      <p:par>
+        <p:cTn id="1" dur="indefinite" restart="never" nodeType="tmRoot"/>
+      </p:par>
+    </p:tnLst>
+  </p:timing>
 </p:sld>
 </file>
 
@@ -4988,73 +5300,88 @@
           <a:chExt cx="0" cy="0"/>
         </a:xfrm>
       </p:grpSpPr>
+      <p:sp>
+        <p:nvSpPr>
+          <p:cNvPr id="5" name="ZoneTexte 4"/>
+          <p:cNvSpPr txBox="1"/>
+          <p:nvPr/>
+        </p:nvSpPr>
+        <p:spPr>
+          <a:xfrm>
+            <a:off x="251520" y="260648"/>
+            <a:ext cx="6647974" cy="707886"/>
+          </a:xfrm>
+          <a:prstGeom prst="rect">
+            <a:avLst/>
+          </a:prstGeom>
+          <a:noFill/>
+        </p:spPr>
+        <p:txBody>
+          <a:bodyPr wrap="none" rtlCol="0">
+            <a:spAutoFit/>
+          </a:bodyPr>
+          <a:lstStyle/>
+          <a:p>
+            <a:r>
+              <a:rPr lang="fr-FR" sz="4000" b="1" dirty="0" smtClean="0">
+                <a:latin typeface="Courier New" pitchFamily="49" charset="0"/>
+                <a:cs typeface="Courier New" pitchFamily="49" charset="0"/>
+              </a:rPr>
+              <a:t>Formulaire Exposition</a:t>
+            </a:r>
+            <a:endParaRPr lang="fr-FR" sz="4000" b="1" dirty="0">
+              <a:latin typeface="Courier New" pitchFamily="49" charset="0"/>
+              <a:cs typeface="Courier New" pitchFamily="49" charset="0"/>
+            </a:endParaRPr>
+          </a:p>
+        </p:txBody>
+      </p:sp>
       <p:pic>
         <p:nvPicPr>
-          <p:cNvPr id="7170" name="Picture 2" descr="C:\Users\Franck\Downloads\CRUD_Expo.PNG"/>
+          <p:cNvPr id="4" name="Image 3" descr="CaptureFormExposition.PNG"/>
           <p:cNvPicPr>
-            <a:picLocks noChangeAspect="1" noChangeArrowheads="1"/>
+            <a:picLocks noChangeAspect="1"/>
           </p:cNvPicPr>
           <p:nvPr/>
         </p:nvPicPr>
         <p:blipFill>
           <a:blip r:embed="rId2" cstate="print"/>
-          <a:srcRect/>
           <a:stretch>
             <a:fillRect/>
           </a:stretch>
         </p:blipFill>
-        <p:spPr bwMode="auto">
-          <a:xfrm>
-            <a:off x="1403648" y="1052736"/>
-            <a:ext cx="7200800" cy="5661248"/>
+        <p:spPr>
+          <a:xfrm>
+            <a:off x="1669118" y="1124744"/>
+            <a:ext cx="6575290" cy="5472608"/>
           </a:xfrm>
           <a:prstGeom prst="rect">
             <a:avLst/>
           </a:prstGeom>
-          <a:noFill/>
+          <a:ln>
+            <a:noFill/>
+          </a:ln>
+          <a:effectLst>
+            <a:outerShdw blurRad="190500" algn="tl" rotWithShape="0">
+              <a:srgbClr val="000000">
+                <a:alpha val="70000"/>
+              </a:srgbClr>
+            </a:outerShdw>
+          </a:effectLst>
         </p:spPr>
       </p:pic>
-      <p:sp>
-        <p:nvSpPr>
-          <p:cNvPr id="5" name="ZoneTexte 4"/>
-          <p:cNvSpPr txBox="1"/>
-          <p:nvPr/>
-        </p:nvSpPr>
-        <p:spPr>
-          <a:xfrm>
-            <a:off x="251520" y="260648"/>
-            <a:ext cx="6647974" cy="707886"/>
-          </a:xfrm>
-          <a:prstGeom prst="rect">
-            <a:avLst/>
-          </a:prstGeom>
-          <a:noFill/>
-        </p:spPr>
-        <p:txBody>
-          <a:bodyPr wrap="none" rtlCol="0">
-            <a:spAutoFit/>
-          </a:bodyPr>
-          <a:lstStyle/>
-          <a:p>
-            <a:r>
-              <a:rPr lang="fr-FR" sz="4000" b="1" dirty="0" smtClean="0">
-                <a:latin typeface="Courier New" pitchFamily="49" charset="0"/>
-                <a:cs typeface="Courier New" pitchFamily="49" charset="0"/>
-              </a:rPr>
-              <a:t>Formulaire Exposition</a:t>
-            </a:r>
-            <a:endParaRPr lang="fr-FR" sz="4000" b="1" dirty="0">
-              <a:latin typeface="Courier New" pitchFamily="49" charset="0"/>
-              <a:cs typeface="Courier New" pitchFamily="49" charset="0"/>
-            </a:endParaRPr>
-          </a:p>
-        </p:txBody>
-      </p:sp>
     </p:spTree>
   </p:cSld>
   <p:clrMapOvr>
     <a:masterClrMapping/>
   </p:clrMapOvr>
+  <p:timing>
+    <p:tnLst>
+      <p:par>
+        <p:cTn id="1" dur="indefinite" restart="never" nodeType="tmRoot"/>
+      </p:par>
+    </p:tnLst>
+  </p:timing>
 </p:sld>
 </file>
 
@@ -5077,14 +5404,14 @@
       </p:grpSpPr>
       <p:sp>
         <p:nvSpPr>
-          <p:cNvPr id="3" name="ZoneTexte 2"/>
+          <p:cNvPr id="5" name="ZoneTexte 4"/>
           <p:cNvSpPr txBox="1"/>
           <p:nvPr/>
         </p:nvSpPr>
         <p:spPr>
           <a:xfrm>
             <a:off x="251520" y="260648"/>
-            <a:ext cx="5724644" cy="707886"/>
+            <a:ext cx="8494633" cy="707886"/>
           </a:xfrm>
           <a:prstGeom prst="rect">
             <a:avLst/>
@@ -5102,7 +5429,7 @@
                 <a:latin typeface="Courier New" pitchFamily="49" charset="0"/>
                 <a:cs typeface="Courier New" pitchFamily="49" charset="0"/>
               </a:rPr>
-              <a:t>Gestion des Œuvres</a:t>
+              <a:t>Création d’un nouvel auteur</a:t>
             </a:r>
             <a:endParaRPr lang="fr-FR" sz="4000" b="1" dirty="0">
               <a:latin typeface="Courier New" pitchFamily="49" charset="0"/>
@@ -5113,28 +5440,36 @@
       </p:sp>
       <p:pic>
         <p:nvPicPr>
-          <p:cNvPr id="4098" name="Picture 2" descr="C:\Users\Franck\Downloads\Menu_Oeuvre.PNG"/>
+          <p:cNvPr id="6" name="Image 5" descr="CaptureFormAuteur.PNG"/>
           <p:cNvPicPr>
-            <a:picLocks noChangeAspect="1" noChangeArrowheads="1"/>
+            <a:picLocks noChangeAspect="1"/>
           </p:cNvPicPr>
           <p:nvPr/>
         </p:nvPicPr>
         <p:blipFill>
           <a:blip r:embed="rId2" cstate="print"/>
-          <a:srcRect/>
           <a:stretch>
             <a:fillRect/>
           </a:stretch>
         </p:blipFill>
-        <p:spPr bwMode="auto">
-          <a:xfrm>
-            <a:off x="1259632" y="1052736"/>
-            <a:ext cx="7632848" cy="5616624"/>
+        <p:spPr>
+          <a:xfrm>
+            <a:off x="1907704" y="1268760"/>
+            <a:ext cx="6325483" cy="5298600"/>
           </a:xfrm>
           <a:prstGeom prst="rect">
             <a:avLst/>
           </a:prstGeom>
-          <a:noFill/>
+          <a:ln>
+            <a:noFill/>
+          </a:ln>
+          <a:effectLst>
+            <a:outerShdw blurRad="190500" algn="tl" rotWithShape="0">
+              <a:srgbClr val="000000">
+                <a:alpha val="70000"/>
+              </a:srgbClr>
+            </a:outerShdw>
+          </a:effectLst>
         </p:spPr>
       </p:pic>
     </p:spTree>
@@ -5164,14 +5499,14 @@
       </p:grpSpPr>
       <p:sp>
         <p:nvSpPr>
-          <p:cNvPr id="2" name="ZoneTexte 1"/>
+          <p:cNvPr id="3" name="ZoneTexte 2"/>
           <p:cNvSpPr txBox="1"/>
           <p:nvPr/>
         </p:nvSpPr>
         <p:spPr>
           <a:xfrm>
             <a:off x="251520" y="260648"/>
-            <a:ext cx="7263527" cy="707886"/>
+            <a:ext cx="5724644" cy="707886"/>
           </a:xfrm>
           <a:prstGeom prst="rect">
             <a:avLst/>
@@ -5189,14 +5524,7 @@
                 <a:latin typeface="Courier New" pitchFamily="49" charset="0"/>
                 <a:cs typeface="Courier New" pitchFamily="49" charset="0"/>
               </a:rPr>
-              <a:t>Impression du </a:t>
-            </a:r>
-            <a:r>
-              <a:rPr lang="fr-FR" sz="4000" b="1" dirty="0" err="1" smtClean="0">
-                <a:latin typeface="Courier New" pitchFamily="49" charset="0"/>
-                <a:cs typeface="Courier New" pitchFamily="49" charset="0"/>
-              </a:rPr>
-              <a:t>FlashCode</a:t>
+              <a:t>Gestion des Œuvres</a:t>
             </a:r>
             <a:endParaRPr lang="fr-FR" sz="4000" b="1" dirty="0">
               <a:latin typeface="Courier New" pitchFamily="49" charset="0"/>
@@ -5207,7 +5535,7 @@
       </p:sp>
       <p:pic>
         <p:nvPicPr>
-          <p:cNvPr id="5122" name="Picture 2" descr="C:\Users\Franck\Downloads\Capture3.PNG"/>
+          <p:cNvPr id="4098" name="Picture 2" descr="C:\Users\Franck\Downloads\Menu_Oeuvre.PNG"/>
           <p:cNvPicPr>
             <a:picLocks noChangeAspect="1" noChangeArrowheads="1"/>
           </p:cNvPicPr>
@@ -5222,13 +5550,22 @@
         </p:blipFill>
         <p:spPr bwMode="auto">
           <a:xfrm>
-            <a:off x="1403648" y="1196752"/>
-            <a:ext cx="7488832" cy="5455543"/>
+            <a:off x="1259632" y="1052736"/>
+            <a:ext cx="7632848" cy="5616624"/>
           </a:xfrm>
           <a:prstGeom prst="rect">
             <a:avLst/>
           </a:prstGeom>
-          <a:noFill/>
+          <a:ln>
+            <a:noFill/>
+          </a:ln>
+          <a:effectLst>
+            <a:outerShdw blurRad="190500" algn="tl" rotWithShape="0">
+              <a:srgbClr val="000000">
+                <a:alpha val="70000"/>
+              </a:srgbClr>
+            </a:outerShdw>
+          </a:effectLst>
         </p:spPr>
       </p:pic>
     </p:spTree>
@@ -5236,6 +5573,13 @@
   <p:clrMapOvr>
     <a:masterClrMapping/>
   </p:clrMapOvr>
+  <p:timing>
+    <p:tnLst>
+      <p:par>
+        <p:cTn id="1" dur="indefinite" restart="never" nodeType="tmRoot"/>
+      </p:par>
+    </p:tnLst>
+  </p:timing>
 </p:sld>
 </file>
 

</xml_diff>